<commit_message>
Update Oficina - Automação de Relatórios com IA e Python.pptx
</commit_message>
<xml_diff>
--- a/SEMPRO 2024/Oficina - Automação de Relatórios com IA e Python.pptx
+++ b/SEMPRO 2024/Oficina - Automação de Relatórios com IA e Python.pptx
@@ -28529,7 +28529,15 @@
             </a:br>
             <a:r>
               <a:rPr lang="pt-BR" sz="6600" dirty="0"/>
-              <a:t>Automação de Relatórios com IA e Python</a:t>
+              <a:t>Automação de Relatórios com </a:t>
+            </a:r>
+            <a:r>
+              <a:rPr lang="pt-BR" sz="6600" dirty="0" err="1"/>
+              <a:t>ChatGPT</a:t>
+            </a:r>
+            <a:r>
+              <a:rPr lang="pt-BR" sz="6600" dirty="0"/>
+              <a:t> e Python</a:t>
             </a:r>
           </a:p>
         </p:txBody>
@@ -32360,7 +32368,15 @@
             </a:br>
             <a:r>
               <a:rPr lang="pt-BR" sz="6600" dirty="0"/>
-              <a:t>Automação de Relatórios com IA e Python</a:t>
+              <a:t>Automação de Relatórios com </a:t>
+            </a:r>
+            <a:r>
+              <a:rPr lang="pt-BR" sz="6600"/>
+              <a:t>ChatGPT </a:t>
+            </a:r>
+            <a:r>
+              <a:rPr lang="pt-BR" sz="6600" dirty="0"/>
+              <a:t>e Python</a:t>
             </a:r>
           </a:p>
         </p:txBody>

</xml_diff>